<commit_message>
Add wave-based row shading to summary page (W-1/W-3 white, W-2 gray, W-4 light gray)
</commit_message>
<xml_diff>
--- a/Governance/Driver Handout Sample page with Data tables description.pptx
+++ b/Governance/Driver Handout Sample page with Data tables description.pptx
@@ -104,6 +104,11 @@
       </a:defRPr>
     </a:lvl9pPr>
   </p:defaultTextStyle>
+  <p:extLst>
+    <p:ext uri="{EFAFB233-063F-42B5-8137-9DF3F51BA10A}">
+      <p15:sldGuideLst xmlns:p15="http://schemas.microsoft.com/office/powerpoint/2012/main"/>
+    </p:ext>
+  </p:extLst>
 </p:presentation>
 </file>
 
@@ -3353,118 +3358,25 @@
       </p:pic>
       <p:sp>
         <p:nvSpPr>
-          <p:cNvPr id="2" name="TextBox 1">
-            <a:extLst>
-              <a:ext uri="{FF2B5EF4-FFF2-40B4-BE49-F238E27FC236}">
-                <a16:creationId xmlns:a16="http://schemas.microsoft.com/office/drawing/2014/main" id="{AB0439BE-0FE3-0774-5D5B-DF8A4E1BAFFD}"/>
-              </a:ext>
-            </a:extLst>
-          </p:cNvPr>
-          <p:cNvSpPr txBox="1"/>
+          <p:cNvPr id="7" name="Rectangle 6">
+            <a:extLst>
+              <a:ext uri="{FF2B5EF4-FFF2-40B4-BE49-F238E27FC236}">
+                <a16:creationId xmlns:a16="http://schemas.microsoft.com/office/drawing/2014/main" id="{C8B0373B-942A-CFB0-E9AC-E8C5E0BA2939}"/>
+              </a:ext>
+            </a:extLst>
+          </p:cNvPr>
+          <p:cNvSpPr/>
           <p:nvPr/>
         </p:nvSpPr>
         <p:spPr>
           <a:xfrm>
-            <a:off x="6501281" y="3790772"/>
-            <a:ext cx="3503573" cy="923330"/>
+            <a:off x="1436914" y="314325"/>
+            <a:ext cx="4690382" cy="6123545"/>
           </a:xfrm>
           <a:prstGeom prst="rect">
             <a:avLst/>
           </a:prstGeom>
           <a:noFill/>
-          <a:ln>
-            <a:solidFill>
-              <a:srgbClr val="FF0000"/>
-            </a:solidFill>
-          </a:ln>
-        </p:spPr>
-        <p:txBody>
-          <a:bodyPr wrap="square" rtlCol="0">
-            <a:spAutoFit/>
-          </a:bodyPr>
-          <a:lstStyle/>
-          <a:p>
-            <a:r>
-              <a:rPr lang="en-US" dirty="0">
-                <a:solidFill>
-                  <a:srgbClr val="FF0000"/>
-                </a:solidFill>
-              </a:rPr>
-              <a:t>TABLE 2 “OV” – List the Zone and QTY of the oversize packages as shown on the route sheet</a:t>
-            </a:r>
-          </a:p>
-        </p:txBody>
-      </p:sp>
-      <p:sp>
-        <p:nvSpPr>
-          <p:cNvPr id="4" name="TextBox 3">
-            <a:extLst>
-              <a:ext uri="{FF2B5EF4-FFF2-40B4-BE49-F238E27FC236}">
-                <a16:creationId xmlns:a16="http://schemas.microsoft.com/office/drawing/2014/main" id="{DCD06D22-18DB-2D79-3371-F8E417661F2D}"/>
-              </a:ext>
-            </a:extLst>
-          </p:cNvPr>
-          <p:cNvSpPr txBox="1"/>
-          <p:nvPr/>
-        </p:nvSpPr>
-        <p:spPr>
-          <a:xfrm>
-            <a:off x="6376087" y="1953053"/>
-            <a:ext cx="2487827" cy="1477328"/>
-          </a:xfrm>
-          <a:prstGeom prst="rect">
-            <a:avLst/>
-          </a:prstGeom>
-          <a:noFill/>
-          <a:ln>
-            <a:solidFill>
-              <a:srgbClr val="FF0000"/>
-            </a:solidFill>
-          </a:ln>
-        </p:spPr>
-        <p:txBody>
-          <a:bodyPr wrap="square" rtlCol="0">
-            <a:spAutoFit/>
-          </a:bodyPr>
-          <a:lstStyle/>
-          <a:p>
-            <a:r>
-              <a:rPr lang="en-US" dirty="0">
-                <a:solidFill>
-                  <a:srgbClr val="FF0000"/>
-                </a:solidFill>
-              </a:rPr>
-              <a:t>TAVBLE 1 – “BAGS” – Just the bag code “GRN056”, these are listed by the sort order from the route sheet</a:t>
-            </a:r>
-          </a:p>
-        </p:txBody>
-      </p:sp>
-      <p:sp>
-        <p:nvSpPr>
-          <p:cNvPr id="5" name="Rectangle 4">
-            <a:extLst>
-              <a:ext uri="{FF2B5EF4-FFF2-40B4-BE49-F238E27FC236}">
-                <a16:creationId xmlns:a16="http://schemas.microsoft.com/office/drawing/2014/main" id="{504A85A5-CD33-649C-0788-DEB55C29009E}"/>
-              </a:ext>
-            </a:extLst>
-          </p:cNvPr>
-          <p:cNvSpPr/>
-          <p:nvPr/>
-        </p:nvSpPr>
-        <p:spPr>
-          <a:xfrm>
-            <a:off x="3885168" y="4127156"/>
-            <a:ext cx="1016346" cy="1173893"/>
-          </a:xfrm>
-          <a:prstGeom prst="rect">
-            <a:avLst/>
-          </a:prstGeom>
-          <a:noFill/>
-          <a:ln>
-            <a:solidFill>
-              <a:srgbClr val="FF0000"/>
-            </a:solidFill>
-          </a:ln>
         </p:spPr>
         <p:style>
           <a:lnRef idx="2">
@@ -3491,147 +3403,6 @@
           </a:p>
         </p:txBody>
       </p:sp>
-      <p:sp>
-        <p:nvSpPr>
-          <p:cNvPr id="6" name="Rectangle 5">
-            <a:extLst>
-              <a:ext uri="{FF2B5EF4-FFF2-40B4-BE49-F238E27FC236}">
-                <a16:creationId xmlns:a16="http://schemas.microsoft.com/office/drawing/2014/main" id="{704B7838-D0BB-B8C1-7885-094E5E3F720B}"/>
-              </a:ext>
-            </a:extLst>
-          </p:cNvPr>
-          <p:cNvSpPr/>
-          <p:nvPr/>
-        </p:nvSpPr>
-        <p:spPr>
-          <a:xfrm>
-            <a:off x="4960206" y="4184822"/>
-            <a:ext cx="971037" cy="1116226"/>
-          </a:xfrm>
-          <a:prstGeom prst="rect">
-            <a:avLst/>
-          </a:prstGeom>
-          <a:noFill/>
-          <a:ln>
-            <a:solidFill>
-              <a:srgbClr val="FF0000"/>
-            </a:solidFill>
-          </a:ln>
-        </p:spPr>
-        <p:style>
-          <a:lnRef idx="2">
-            <a:schemeClr val="accent1">
-              <a:shade val="15000"/>
-            </a:schemeClr>
-          </a:lnRef>
-          <a:fillRef idx="1">
-            <a:schemeClr val="accent1"/>
-          </a:fillRef>
-          <a:effectRef idx="0">
-            <a:schemeClr val="accent1"/>
-          </a:effectRef>
-          <a:fontRef idx="minor">
-            <a:schemeClr val="lt1"/>
-          </a:fontRef>
-        </p:style>
-        <p:txBody>
-          <a:bodyPr rtlCol="0" anchor="ctr"/>
-          <a:lstStyle/>
-          <a:p>
-            <a:pPr algn="ctr"/>
-            <a:endParaRPr lang="en-US"/>
-          </a:p>
-        </p:txBody>
-      </p:sp>
-      <p:cxnSp>
-        <p:nvCxnSpPr>
-          <p:cNvPr id="9" name="Straight Arrow Connector 8">
-            <a:extLst>
-              <a:ext uri="{FF2B5EF4-FFF2-40B4-BE49-F238E27FC236}">
-                <a16:creationId xmlns:a16="http://schemas.microsoft.com/office/drawing/2014/main" id="{22885DE2-13CF-7BDE-5C0D-E377625DA9F9}"/>
-              </a:ext>
-            </a:extLst>
-          </p:cNvPr>
-          <p:cNvCxnSpPr>
-            <a:stCxn id="4" idx="1"/>
-          </p:cNvCxnSpPr>
-          <p:nvPr/>
-        </p:nvCxnSpPr>
-        <p:spPr>
-          <a:xfrm flipH="1">
-            <a:off x="4526692" y="2691717"/>
-            <a:ext cx="1849395" cy="1435439"/>
-          </a:xfrm>
-          <a:prstGeom prst="straightConnector1">
-            <a:avLst/>
-          </a:prstGeom>
-          <a:ln>
-            <a:solidFill>
-              <a:srgbClr val="FF0000"/>
-            </a:solidFill>
-            <a:tailEnd type="triangle"/>
-          </a:ln>
-        </p:spPr>
-        <p:style>
-          <a:lnRef idx="2">
-            <a:schemeClr val="accent1"/>
-          </a:lnRef>
-          <a:fillRef idx="0">
-            <a:schemeClr val="accent1"/>
-          </a:fillRef>
-          <a:effectRef idx="1">
-            <a:schemeClr val="accent1"/>
-          </a:effectRef>
-          <a:fontRef idx="minor">
-            <a:schemeClr val="tx1"/>
-          </a:fontRef>
-        </p:style>
-      </p:cxnSp>
-      <p:cxnSp>
-        <p:nvCxnSpPr>
-          <p:cNvPr id="11" name="Straight Arrow Connector 10">
-            <a:extLst>
-              <a:ext uri="{FF2B5EF4-FFF2-40B4-BE49-F238E27FC236}">
-                <a16:creationId xmlns:a16="http://schemas.microsoft.com/office/drawing/2014/main" id="{379E5E24-3C18-FFA0-3977-F2605FC7F26F}"/>
-              </a:ext>
-            </a:extLst>
-          </p:cNvPr>
-          <p:cNvCxnSpPr>
-            <a:cxnSpLocks/>
-            <a:stCxn id="2" idx="1"/>
-          </p:cNvCxnSpPr>
-          <p:nvPr/>
-        </p:nvCxnSpPr>
-        <p:spPr>
-          <a:xfrm flipH="1">
-            <a:off x="5931243" y="4252437"/>
-            <a:ext cx="570038" cy="235110"/>
-          </a:xfrm>
-          <a:prstGeom prst="straightConnector1">
-            <a:avLst/>
-          </a:prstGeom>
-          <a:ln>
-            <a:solidFill>
-              <a:srgbClr val="FF0000"/>
-            </a:solidFill>
-            <a:tailEnd type="triangle"/>
-          </a:ln>
-        </p:spPr>
-        <p:style>
-          <a:lnRef idx="2">
-            <a:schemeClr val="accent1"/>
-          </a:lnRef>
-          <a:fillRef idx="0">
-            <a:schemeClr val="accent1"/>
-          </a:fillRef>
-          <a:effectRef idx="1">
-            <a:schemeClr val="accent1"/>
-          </a:effectRef>
-          <a:fontRef idx="minor">
-            <a:schemeClr val="tx1"/>
-          </a:fontRef>
-        </p:style>
-      </p:cxnSp>
     </p:spTree>
     <p:extLst>
       <p:ext uri="{BB962C8B-B14F-4D97-AF65-F5344CB8AC3E}">

</xml_diff>